<commit_message>
Added files via upload
</commit_message>
<xml_diff>
--- a/WebLOAD.pptx
+++ b/WebLOAD.pptx
@@ -9,6 +9,7 @@
     <p:sldId id="257" r:id="rId3"/>
     <p:sldId id="260" r:id="rId4"/>
     <p:sldId id="259" r:id="rId5"/>
+    <p:sldId id="261" r:id="rId6"/>
   </p:sldIdLst>
   <p:sldSz cx="12192000" cy="6858000"/>
   <p:notesSz cx="6858000" cy="9144000"/>
@@ -394,7 +395,7 @@
             <a:fld id="{DBC2579F-BF3C-413C-887A-893CBC8AD14B}" type="slidenum">
               <a:rPr lang="es-MX" smtClean="0"/>
               <a:pPr/>
-              <a:t>‹#›</a:t>
+              <a:t>‹Nº›</a:t>
             </a:fld>
             <a:endParaRPr lang="es-MX"/>
           </a:p>
@@ -566,7 +567,7 @@
             <a:fld id="{DBC2579F-BF3C-413C-887A-893CBC8AD14B}" type="slidenum">
               <a:rPr lang="es-MX" smtClean="0"/>
               <a:pPr/>
-              <a:t>‹#›</a:t>
+              <a:t>‹Nº›</a:t>
             </a:fld>
             <a:endParaRPr lang="es-MX"/>
           </a:p>
@@ -748,7 +749,7 @@
             <a:fld id="{DBC2579F-BF3C-413C-887A-893CBC8AD14B}" type="slidenum">
               <a:rPr lang="es-MX" smtClean="0"/>
               <a:pPr/>
-              <a:t>‹#›</a:t>
+              <a:t>‹Nº›</a:t>
             </a:fld>
             <a:endParaRPr lang="es-MX"/>
           </a:p>
@@ -920,7 +921,7 @@
             <a:fld id="{DBC2579F-BF3C-413C-887A-893CBC8AD14B}" type="slidenum">
               <a:rPr lang="es-MX" smtClean="0"/>
               <a:pPr/>
-              <a:t>‹#›</a:t>
+              <a:t>‹Nº›</a:t>
             </a:fld>
             <a:endParaRPr lang="es-MX"/>
           </a:p>
@@ -1180,7 +1181,7 @@
             <a:fld id="{DBC2579F-BF3C-413C-887A-893CBC8AD14B}" type="slidenum">
               <a:rPr lang="es-MX" smtClean="0"/>
               <a:pPr/>
-              <a:t>‹#›</a:t>
+              <a:t>‹Nº›</a:t>
             </a:fld>
             <a:endParaRPr lang="es-MX"/>
           </a:p>
@@ -1470,7 +1471,7 @@
             <a:fld id="{DBC2579F-BF3C-413C-887A-893CBC8AD14B}" type="slidenum">
               <a:rPr lang="es-MX" smtClean="0"/>
               <a:pPr/>
-              <a:t>‹#›</a:t>
+              <a:t>‹Nº›</a:t>
             </a:fld>
             <a:endParaRPr lang="es-MX"/>
           </a:p>
@@ -1914,7 +1915,7 @@
             <a:fld id="{DBC2579F-BF3C-413C-887A-893CBC8AD14B}" type="slidenum">
               <a:rPr lang="es-MX" smtClean="0"/>
               <a:pPr/>
-              <a:t>‹#›</a:t>
+              <a:t>‹Nº›</a:t>
             </a:fld>
             <a:endParaRPr lang="es-MX"/>
           </a:p>
@@ -2034,7 +2035,7 @@
             <a:fld id="{DBC2579F-BF3C-413C-887A-893CBC8AD14B}" type="slidenum">
               <a:rPr lang="es-MX" smtClean="0"/>
               <a:pPr/>
-              <a:t>‹#›</a:t>
+              <a:t>‹Nº›</a:t>
             </a:fld>
             <a:endParaRPr lang="es-MX"/>
           </a:p>
@@ -2131,7 +2132,7 @@
             <a:fld id="{DBC2579F-BF3C-413C-887A-893CBC8AD14B}" type="slidenum">
               <a:rPr lang="es-MX" smtClean="0"/>
               <a:pPr/>
-              <a:t>‹#›</a:t>
+              <a:t>‹Nº›</a:t>
             </a:fld>
             <a:endParaRPr lang="es-MX"/>
           </a:p>
@@ -2421,7 +2422,7 @@
             <a:fld id="{DBC2579F-BF3C-413C-887A-893CBC8AD14B}" type="slidenum">
               <a:rPr lang="es-MX" smtClean="0"/>
               <a:pPr/>
-              <a:t>‹#›</a:t>
+              <a:t>‹Nº›</a:t>
             </a:fld>
             <a:endParaRPr lang="es-MX"/>
           </a:p>
@@ -2701,7 +2702,7 @@
             <a:fld id="{DBC2579F-BF3C-413C-887A-893CBC8AD14B}" type="slidenum">
               <a:rPr lang="es-MX" smtClean="0"/>
               <a:pPr/>
-              <a:t>‹#›</a:t>
+              <a:t>‹Nº›</a:t>
             </a:fld>
             <a:endParaRPr lang="es-MX"/>
           </a:p>
@@ -3030,7 +3031,7 @@
             <a:fld id="{DBC2579F-BF3C-413C-887A-893CBC8AD14B}" type="slidenum">
               <a:rPr lang="es-MX" smtClean="0"/>
               <a:pPr/>
-              <a:t>‹#›</a:t>
+              <a:t>‹Nº›</a:t>
             </a:fld>
             <a:endParaRPr lang="es-MX"/>
           </a:p>
@@ -3888,29 +3889,383 @@
           </a:p>
         </p:txBody>
       </p:sp>
-      <p:sp>
-        <p:nvSpPr>
-          <p:cNvPr id="3" name="Marcador de contenido 2"/>
-          <p:cNvSpPr>
-            <a:spLocks noGrp="1"/>
-          </p:cNvSpPr>
-          <p:nvPr>
-            <p:ph idx="1"/>
-          </p:nvPr>
-        </p:nvSpPr>
-        <p:spPr/>
-        <p:txBody>
-          <a:bodyPr/>
-          <a:lstStyle/>
-          <a:p>
-            <a:endParaRPr lang="es-MX"/>
-          </a:p>
-        </p:txBody>
-      </p:sp>
+      <p:pic>
+        <p:nvPicPr>
+          <p:cNvPr id="4" name="Imagen 3"/>
+          <p:cNvPicPr>
+            <a:picLocks noChangeAspect="1"/>
+          </p:cNvPicPr>
+          <p:nvPr/>
+        </p:nvPicPr>
+        <p:blipFill rotWithShape="1">
+          <a:blip r:embed="rId2"/>
+          <a:srcRect t="3835"/>
+          <a:stretch/>
+        </p:blipFill>
+        <p:spPr>
+          <a:xfrm>
+            <a:off x="3606247" y="1311965"/>
+            <a:ext cx="7912163" cy="4717136"/>
+          </a:xfrm>
+          <a:prstGeom prst="rect">
+            <a:avLst/>
+          </a:prstGeom>
+        </p:spPr>
+      </p:pic>
     </p:spTree>
     <p:extLst>
       <p:ext uri="{BB962C8B-B14F-4D97-AF65-F5344CB8AC3E}">
         <p14:creationId xmlns:p14="http://schemas.microsoft.com/office/powerpoint/2010/main" val="1645627743"/>
+      </p:ext>
+    </p:extLst>
+  </p:cSld>
+  <p:clrMapOvr>
+    <a:masterClrMapping/>
+  </p:clrMapOvr>
+</p:sld>
+</file>
+
+<file path=ppt/slides/slide5.xml><?xml version="1.0" encoding="utf-8"?>
+<p:sld xmlns:a="http://schemas.openxmlformats.org/drawingml/2006/main" xmlns:r="http://schemas.openxmlformats.org/officeDocument/2006/relationships" xmlns:p="http://schemas.openxmlformats.org/presentationml/2006/main">
+  <p:cSld>
+    <p:spTree>
+      <p:nvGrpSpPr>
+        <p:cNvPr id="1" name=""/>
+        <p:cNvGrpSpPr/>
+        <p:nvPr/>
+      </p:nvGrpSpPr>
+      <p:grpSpPr>
+        <a:xfrm>
+          <a:off x="0" y="0"/>
+          <a:ext cx="0" cy="0"/>
+          <a:chOff x="0" y="0"/>
+          <a:chExt cx="0" cy="0"/>
+        </a:xfrm>
+      </p:grpSpPr>
+      <p:sp>
+        <p:nvSpPr>
+          <p:cNvPr id="2" name="Título 1"/>
+          <p:cNvSpPr>
+            <a:spLocks noGrp="1"/>
+          </p:cNvSpPr>
+          <p:nvPr>
+            <p:ph type="title"/>
+          </p:nvPr>
+        </p:nvSpPr>
+        <p:spPr/>
+        <p:txBody>
+          <a:bodyPr/>
+          <a:lstStyle/>
+          <a:p>
+            <a:r>
+              <a:rPr lang="es-MX" dirty="0"/>
+              <a:t>Soporte</a:t>
+            </a:r>
+            <a:endParaRPr lang="es-ES" dirty="0"/>
+          </a:p>
+        </p:txBody>
+      </p:sp>
+      <p:sp>
+        <p:nvSpPr>
+          <p:cNvPr id="3" name="Marcador de contenido 2"/>
+          <p:cNvSpPr>
+            <a:spLocks noGrp="1"/>
+          </p:cNvSpPr>
+          <p:nvPr>
+            <p:ph idx="1"/>
+          </p:nvPr>
+        </p:nvSpPr>
+        <p:spPr/>
+        <p:txBody>
+          <a:bodyPr numCol="3"/>
+          <a:lstStyle/>
+          <a:p>
+            <a:r>
+              <a:rPr lang="es-MX" dirty="0"/>
+              <a:t>Web</a:t>
+            </a:r>
+          </a:p>
+          <a:p>
+            <a:pPr lvl="1"/>
+            <a:r>
+              <a:rPr lang="es-MX" dirty="0"/>
+              <a:t>Html5</a:t>
+            </a:r>
+          </a:p>
+          <a:p>
+            <a:pPr lvl="1"/>
+            <a:r>
+              <a:rPr lang="es-MX" dirty="0"/>
+              <a:t>HTTP</a:t>
+            </a:r>
+          </a:p>
+          <a:p>
+            <a:pPr lvl="1"/>
+            <a:r>
+              <a:rPr lang="es-MX" dirty="0"/>
+              <a:t>XML</a:t>
+            </a:r>
+          </a:p>
+          <a:p>
+            <a:pPr lvl="1"/>
+            <a:r>
+              <a:rPr lang="es-MX" dirty="0"/>
+              <a:t>SOAP</a:t>
+            </a:r>
+            <a:r>
+              <a:rPr lang="es-ES" dirty="0"/>
+              <a:t> y REST</a:t>
+            </a:r>
+          </a:p>
+          <a:p>
+            <a:pPr lvl="1"/>
+            <a:r>
+              <a:rPr lang="es-MX" dirty="0"/>
+              <a:t>AJAX</a:t>
+            </a:r>
+          </a:p>
+          <a:p>
+            <a:pPr lvl="1"/>
+            <a:r>
+              <a:rPr lang="es-MX" dirty="0"/>
+              <a:t>JSON</a:t>
+            </a:r>
+          </a:p>
+          <a:p>
+            <a:pPr lvl="1"/>
+            <a:r>
+              <a:rPr lang="es-MX" dirty="0"/>
+              <a:t>Java</a:t>
+            </a:r>
+          </a:p>
+          <a:p>
+            <a:pPr lvl="1"/>
+            <a:r>
+              <a:rPr lang="es-MX" dirty="0"/>
+              <a:t>JS</a:t>
+            </a:r>
+          </a:p>
+          <a:p>
+            <a:r>
+              <a:rPr lang="es-MX" dirty="0"/>
+              <a:t>Protocolos Web</a:t>
+            </a:r>
+          </a:p>
+          <a:p>
+            <a:pPr lvl="1"/>
+            <a:r>
+              <a:rPr lang="es-MX" dirty="0"/>
+              <a:t>FTP</a:t>
+            </a:r>
+          </a:p>
+          <a:p>
+            <a:pPr lvl="1"/>
+            <a:r>
+              <a:rPr lang="es-MX" dirty="0"/>
+              <a:t>SMTP</a:t>
+            </a:r>
+          </a:p>
+          <a:p>
+            <a:pPr lvl="1"/>
+            <a:r>
+              <a:rPr lang="es-MX" dirty="0"/>
+              <a:t>TCP/IP</a:t>
+            </a:r>
+          </a:p>
+          <a:p>
+            <a:pPr lvl="1"/>
+            <a:r>
+              <a:rPr lang="es-MX" dirty="0"/>
+              <a:t>UDP</a:t>
+            </a:r>
+          </a:p>
+          <a:p>
+            <a:pPr lvl="1"/>
+            <a:endParaRPr lang="es-MX" dirty="0"/>
+          </a:p>
+          <a:p>
+            <a:r>
+              <a:rPr lang="es-MX" dirty="0"/>
+              <a:t>Bases de Datos</a:t>
+            </a:r>
+          </a:p>
+          <a:p>
+            <a:pPr lvl="1"/>
+            <a:r>
+              <a:rPr lang="es-MX" dirty="0"/>
+              <a:t>Oracle</a:t>
+            </a:r>
+          </a:p>
+          <a:p>
+            <a:pPr lvl="1"/>
+            <a:r>
+              <a:rPr lang="es-MX" dirty="0" err="1"/>
+              <a:t>MySQL</a:t>
+            </a:r>
+            <a:endParaRPr lang="es-MX" dirty="0"/>
+          </a:p>
+          <a:p>
+            <a:pPr lvl="1"/>
+            <a:r>
+              <a:rPr lang="es-MX" dirty="0" err="1"/>
+              <a:t>PostgreSQL</a:t>
+            </a:r>
+            <a:endParaRPr lang="es-MX" dirty="0"/>
+          </a:p>
+          <a:p>
+            <a:pPr lvl="1"/>
+            <a:r>
+              <a:rPr lang="es-MX" dirty="0"/>
+              <a:t>MDB</a:t>
+            </a:r>
+          </a:p>
+          <a:p>
+            <a:pPr lvl="1"/>
+            <a:r>
+              <a:rPr lang="es-MX" dirty="0"/>
+              <a:t>ODBC</a:t>
+            </a:r>
+          </a:p>
+          <a:p>
+            <a:pPr lvl="1"/>
+            <a:r>
+              <a:rPr lang="es-MX" dirty="0"/>
+              <a:t>SQL Server</a:t>
+            </a:r>
+          </a:p>
+          <a:p>
+            <a:r>
+              <a:rPr lang="es-MX" dirty="0"/>
+              <a:t>Seguridad</a:t>
+            </a:r>
+          </a:p>
+          <a:p>
+            <a:pPr lvl="1"/>
+            <a:r>
+              <a:rPr lang="es-MX" dirty="0"/>
+              <a:t>SSL</a:t>
+            </a:r>
+          </a:p>
+          <a:p>
+            <a:pPr lvl="1"/>
+            <a:r>
+              <a:rPr lang="es-MX" dirty="0" err="1"/>
+              <a:t>Radius</a:t>
+            </a:r>
+            <a:endParaRPr lang="es-MX" dirty="0"/>
+          </a:p>
+          <a:p>
+            <a:r>
+              <a:rPr lang="es-MX" dirty="0"/>
+              <a:t>Servers</a:t>
+            </a:r>
+          </a:p>
+          <a:p>
+            <a:pPr lvl="1"/>
+            <a:r>
+              <a:rPr lang="es-MX" dirty="0"/>
+              <a:t>PHP</a:t>
+            </a:r>
+          </a:p>
+          <a:p>
+            <a:pPr lvl="1"/>
+            <a:r>
+              <a:rPr lang="es-MX" dirty="0" err="1"/>
+              <a:t>NodeJS</a:t>
+            </a:r>
+            <a:endParaRPr lang="es-MX" dirty="0"/>
+          </a:p>
+          <a:p>
+            <a:pPr lvl="1"/>
+            <a:r>
+              <a:rPr lang="es-MX" dirty="0"/>
+              <a:t>Apache</a:t>
+            </a:r>
+          </a:p>
+          <a:p>
+            <a:pPr lvl="1"/>
+            <a:r>
+              <a:rPr lang="es-MX" dirty="0" err="1"/>
+              <a:t>Tomcat</a:t>
+            </a:r>
+            <a:endParaRPr lang="es-MX" dirty="0"/>
+          </a:p>
+          <a:p>
+            <a:pPr lvl="1"/>
+            <a:r>
+              <a:rPr lang="es-MX" dirty="0" err="1"/>
+              <a:t>.Net</a:t>
+            </a:r>
+            <a:endParaRPr lang="es-MX" dirty="0"/>
+          </a:p>
+          <a:p>
+            <a:pPr lvl="1"/>
+            <a:r>
+              <a:rPr lang="es-MX" dirty="0"/>
+              <a:t>J2EE</a:t>
+            </a:r>
+          </a:p>
+          <a:p>
+            <a:pPr lvl="1"/>
+            <a:r>
+              <a:rPr lang="es-MX" dirty="0" err="1"/>
+              <a:t>Glassfish</a:t>
+            </a:r>
+            <a:endParaRPr lang="es-MX" dirty="0"/>
+          </a:p>
+          <a:p>
+            <a:r>
+              <a:rPr lang="es-MX" dirty="0"/>
+              <a:t>ERP</a:t>
+            </a:r>
+          </a:p>
+          <a:p>
+            <a:pPr lvl="1"/>
+            <a:r>
+              <a:rPr lang="es-MX" dirty="0"/>
+              <a:t>SAP</a:t>
+            </a:r>
+          </a:p>
+          <a:p>
+            <a:pPr lvl="1"/>
+            <a:r>
+              <a:rPr lang="es-MX" dirty="0" err="1"/>
+              <a:t>PeopleSoft</a:t>
+            </a:r>
+            <a:endParaRPr lang="es-MX" dirty="0"/>
+          </a:p>
+          <a:p>
+            <a:pPr lvl="1"/>
+            <a:r>
+              <a:rPr lang="es-MX" dirty="0"/>
+              <a:t>Oracle</a:t>
+            </a:r>
+          </a:p>
+          <a:p>
+            <a:pPr lvl="1"/>
+            <a:r>
+              <a:rPr lang="es-MX" dirty="0" err="1"/>
+              <a:t>Sharepoint</a:t>
+            </a:r>
+            <a:endParaRPr lang="es-MX" dirty="0"/>
+          </a:p>
+          <a:p>
+            <a:pPr lvl="1"/>
+            <a:r>
+              <a:rPr lang="es-MX"/>
+              <a:t>Dynamics</a:t>
+            </a:r>
+          </a:p>
+          <a:p>
+            <a:pPr lvl="1"/>
+            <a:endParaRPr lang="es-MX"/>
+          </a:p>
+        </p:txBody>
+      </p:sp>
+    </p:spTree>
+    <p:extLst>
+      <p:ext uri="{BB962C8B-B14F-4D97-AF65-F5344CB8AC3E}">
+        <p14:creationId xmlns:p14="http://schemas.microsoft.com/office/powerpoint/2010/main" val="4020679948"/>
       </p:ext>
     </p:extLst>
   </p:cSld>

</xml_diff>